<commit_message>
Updates to interface with ThingSpeak Channel
</commit_message>
<xml_diff>
--- a/WeatherDependsGraphics.pptx
+++ b/WeatherDependsGraphics.pptx
@@ -5,9 +5,7 @@
     <p:sldMasterId id="2147483648" r:id="rId1"/>
   </p:sldMasterIdLst>
   <p:sldIdLst>
-    <p:sldId id="256" r:id="rId2"/>
-    <p:sldId id="258" r:id="rId3"/>
-    <p:sldId id="260" r:id="rId4"/>
+    <p:sldId id="260" r:id="rId2"/>
   </p:sldIdLst>
   <p:sldSz cx="12192000" cy="6858000"/>
   <p:notesSz cx="6858000" cy="9144000"/>
@@ -263,7 +261,7 @@
           <a:p>
             <a:fld id="{5A96BA43-D512-4A2B-B523-D6F7D3CC266B}" type="datetimeFigureOut">
               <a:rPr lang="en-IE" smtClean="0"/>
-              <a:t>02/01/2021</a:t>
+              <a:t>03/01/2021</a:t>
             </a:fld>
             <a:endParaRPr lang="en-IE"/>
           </a:p>
@@ -463,7 +461,7 @@
           <a:p>
             <a:fld id="{5A96BA43-D512-4A2B-B523-D6F7D3CC266B}" type="datetimeFigureOut">
               <a:rPr lang="en-IE" smtClean="0"/>
-              <a:t>02/01/2021</a:t>
+              <a:t>03/01/2021</a:t>
             </a:fld>
             <a:endParaRPr lang="en-IE"/>
           </a:p>
@@ -673,7 +671,7 @@
           <a:p>
             <a:fld id="{5A96BA43-D512-4A2B-B523-D6F7D3CC266B}" type="datetimeFigureOut">
               <a:rPr lang="en-IE" smtClean="0"/>
-              <a:t>02/01/2021</a:t>
+              <a:t>03/01/2021</a:t>
             </a:fld>
             <a:endParaRPr lang="en-IE"/>
           </a:p>
@@ -873,7 +871,7 @@
           <a:p>
             <a:fld id="{5A96BA43-D512-4A2B-B523-D6F7D3CC266B}" type="datetimeFigureOut">
               <a:rPr lang="en-IE" smtClean="0"/>
-              <a:t>02/01/2021</a:t>
+              <a:t>03/01/2021</a:t>
             </a:fld>
             <a:endParaRPr lang="en-IE"/>
           </a:p>
@@ -1149,7 +1147,7 @@
           <a:p>
             <a:fld id="{5A96BA43-D512-4A2B-B523-D6F7D3CC266B}" type="datetimeFigureOut">
               <a:rPr lang="en-IE" smtClean="0"/>
-              <a:t>02/01/2021</a:t>
+              <a:t>03/01/2021</a:t>
             </a:fld>
             <a:endParaRPr lang="en-IE"/>
           </a:p>
@@ -1417,7 +1415,7 @@
           <a:p>
             <a:fld id="{5A96BA43-D512-4A2B-B523-D6F7D3CC266B}" type="datetimeFigureOut">
               <a:rPr lang="en-IE" smtClean="0"/>
-              <a:t>02/01/2021</a:t>
+              <a:t>03/01/2021</a:t>
             </a:fld>
             <a:endParaRPr lang="en-IE"/>
           </a:p>
@@ -1832,7 +1830,7 @@
           <a:p>
             <a:fld id="{5A96BA43-D512-4A2B-B523-D6F7D3CC266B}" type="datetimeFigureOut">
               <a:rPr lang="en-IE" smtClean="0"/>
-              <a:t>02/01/2021</a:t>
+              <a:t>03/01/2021</a:t>
             </a:fld>
             <a:endParaRPr lang="en-IE"/>
           </a:p>
@@ -1974,7 +1972,7 @@
           <a:p>
             <a:fld id="{5A96BA43-D512-4A2B-B523-D6F7D3CC266B}" type="datetimeFigureOut">
               <a:rPr lang="en-IE" smtClean="0"/>
-              <a:t>02/01/2021</a:t>
+              <a:t>03/01/2021</a:t>
             </a:fld>
             <a:endParaRPr lang="en-IE"/>
           </a:p>
@@ -2087,7 +2085,7 @@
           <a:p>
             <a:fld id="{5A96BA43-D512-4A2B-B523-D6F7D3CC266B}" type="datetimeFigureOut">
               <a:rPr lang="en-IE" smtClean="0"/>
-              <a:t>02/01/2021</a:t>
+              <a:t>03/01/2021</a:t>
             </a:fld>
             <a:endParaRPr lang="en-IE"/>
           </a:p>
@@ -2400,7 +2398,7 @@
           <a:p>
             <a:fld id="{5A96BA43-D512-4A2B-B523-D6F7D3CC266B}" type="datetimeFigureOut">
               <a:rPr lang="en-IE" smtClean="0"/>
-              <a:t>02/01/2021</a:t>
+              <a:t>03/01/2021</a:t>
             </a:fld>
             <a:endParaRPr lang="en-IE"/>
           </a:p>
@@ -2689,7 +2687,7 @@
           <a:p>
             <a:fld id="{5A96BA43-D512-4A2B-B523-D6F7D3CC266B}" type="datetimeFigureOut">
               <a:rPr lang="en-IE" smtClean="0"/>
-              <a:t>02/01/2021</a:t>
+              <a:t>03/01/2021</a:t>
             </a:fld>
             <a:endParaRPr lang="en-IE"/>
           </a:p>
@@ -2932,7 +2930,7 @@
           <a:p>
             <a:fld id="{5A96BA43-D512-4A2B-B523-D6F7D3CC266B}" type="datetimeFigureOut">
               <a:rPr lang="en-IE" smtClean="0"/>
-              <a:t>02/01/2021</a:t>
+              <a:t>03/01/2021</a:t>
             </a:fld>
             <a:endParaRPr lang="en-IE"/>
           </a:p>
@@ -3351,1625 +3349,6 @@
       </p:grpSpPr>
       <p:sp>
         <p:nvSpPr>
-          <p:cNvPr id="2" name="Title 1">
-            <a:extLst>
-              <a:ext uri="{FF2B5EF4-FFF2-40B4-BE49-F238E27FC236}">
-                <a16:creationId xmlns:a16="http://schemas.microsoft.com/office/drawing/2014/main" id="{CF59B833-A518-4DC6-A6BE-BA6AA8634FF8}"/>
-              </a:ext>
-            </a:extLst>
-          </p:cNvPr>
-          <p:cNvSpPr>
-            <a:spLocks noGrp="1"/>
-          </p:cNvSpPr>
-          <p:nvPr>
-            <p:ph type="ctrTitle"/>
-          </p:nvPr>
-        </p:nvSpPr>
-        <p:spPr/>
-        <p:txBody>
-          <a:bodyPr/>
-          <a:lstStyle/>
-          <a:p>
-            <a:r>
-              <a:rPr lang="en-IE" dirty="0"/>
-              <a:t>Weather Depends</a:t>
-            </a:r>
-          </a:p>
-        </p:txBody>
-      </p:sp>
-      <p:sp>
-        <p:nvSpPr>
-          <p:cNvPr id="3" name="Subtitle 2">
-            <a:extLst>
-              <a:ext uri="{FF2B5EF4-FFF2-40B4-BE49-F238E27FC236}">
-                <a16:creationId xmlns:a16="http://schemas.microsoft.com/office/drawing/2014/main" id="{2D6B24FF-5392-40E2-967D-03F144DD4F5D}"/>
-              </a:ext>
-            </a:extLst>
-          </p:cNvPr>
-          <p:cNvSpPr>
-            <a:spLocks noGrp="1"/>
-          </p:cNvSpPr>
-          <p:nvPr>
-            <p:ph type="subTitle" idx="1"/>
-          </p:nvPr>
-        </p:nvSpPr>
-        <p:spPr/>
-        <p:txBody>
-          <a:bodyPr>
-            <a:normAutofit lnSpcReduction="10000"/>
-          </a:bodyPr>
-          <a:lstStyle/>
-          <a:p>
-            <a:r>
-              <a:rPr lang="en-IE" dirty="0"/>
-              <a:t>Internet of Things support of Depending on the Weather</a:t>
-            </a:r>
-          </a:p>
-          <a:p>
-            <a:endParaRPr lang="en-IE" dirty="0"/>
-          </a:p>
-          <a:p>
-            <a:r>
-              <a:rPr lang="en-IE" sz="2000" dirty="0"/>
-              <a:t>Kathleen McCarthy Kelleher</a:t>
-            </a:r>
-          </a:p>
-          <a:p>
-            <a:r>
-              <a:rPr lang="en-IE" sz="2000" dirty="0"/>
-              <a:t>Student #: 20042361</a:t>
-            </a:r>
-          </a:p>
-        </p:txBody>
-      </p:sp>
-    </p:spTree>
-    <p:extLst>
-      <p:ext uri="{BB962C8B-B14F-4D97-AF65-F5344CB8AC3E}">
-        <p14:creationId xmlns:p14="http://schemas.microsoft.com/office/powerpoint/2010/main" val="1429394717"/>
-      </p:ext>
-    </p:extLst>
-  </p:cSld>
-  <p:clrMapOvr>
-    <a:masterClrMapping/>
-  </p:clrMapOvr>
-</p:sld>
-</file>
-
-<file path=ppt/slides/slide2.xml><?xml version="1.0" encoding="utf-8"?>
-<p:sld xmlns:a="http://schemas.openxmlformats.org/drawingml/2006/main" xmlns:r="http://schemas.openxmlformats.org/officeDocument/2006/relationships" xmlns:p="http://schemas.openxmlformats.org/presentationml/2006/main">
-  <p:cSld>
-    <p:spTree>
-      <p:nvGrpSpPr>
-        <p:cNvPr id="1" name=""/>
-        <p:cNvGrpSpPr/>
-        <p:nvPr/>
-      </p:nvGrpSpPr>
-      <p:grpSpPr>
-        <a:xfrm>
-          <a:off x="0" y="0"/>
-          <a:ext cx="0" cy="0"/>
-          <a:chOff x="0" y="0"/>
-          <a:chExt cx="0" cy="0"/>
-        </a:xfrm>
-      </p:grpSpPr>
-      <p:sp>
-        <p:nvSpPr>
-          <p:cNvPr id="3" name="Rectangle 2">
-            <a:extLst>
-              <a:ext uri="{FF2B5EF4-FFF2-40B4-BE49-F238E27FC236}">
-                <a16:creationId xmlns:a16="http://schemas.microsoft.com/office/drawing/2014/main" id="{B353F40B-2CEE-439E-9474-BEF586DB0384}"/>
-              </a:ext>
-            </a:extLst>
-          </p:cNvPr>
-          <p:cNvSpPr/>
-          <p:nvPr/>
-        </p:nvSpPr>
-        <p:spPr>
-          <a:xfrm>
-            <a:off x="1262625" y="3025162"/>
-            <a:ext cx="819152" cy="652459"/>
-          </a:xfrm>
-          <a:prstGeom prst="rect">
-            <a:avLst/>
-          </a:prstGeom>
-        </p:spPr>
-        <p:style>
-          <a:lnRef idx="2">
-            <a:schemeClr val="accent1">
-              <a:shade val="50000"/>
-            </a:schemeClr>
-          </a:lnRef>
-          <a:fillRef idx="1">
-            <a:schemeClr val="accent1"/>
-          </a:fillRef>
-          <a:effectRef idx="0">
-            <a:schemeClr val="accent1"/>
-          </a:effectRef>
-          <a:fontRef idx="minor">
-            <a:schemeClr val="lt1"/>
-          </a:fontRef>
-        </p:style>
-        <p:txBody>
-          <a:bodyPr rtlCol="0" anchor="ctr"/>
-          <a:lstStyle/>
-          <a:p>
-            <a:pPr algn="ctr"/>
-            <a:r>
-              <a:rPr lang="en-IE" sz="900" dirty="0"/>
-              <a:t>Get weather forecast from Web API</a:t>
-            </a:r>
-          </a:p>
-        </p:txBody>
-      </p:sp>
-      <p:sp>
-        <p:nvSpPr>
-          <p:cNvPr id="4" name="Rectangle 3">
-            <a:extLst>
-              <a:ext uri="{FF2B5EF4-FFF2-40B4-BE49-F238E27FC236}">
-                <a16:creationId xmlns:a16="http://schemas.microsoft.com/office/drawing/2014/main" id="{FADAC2AD-9859-40BB-9B07-5C7A34C1A25D}"/>
-              </a:ext>
-            </a:extLst>
-          </p:cNvPr>
-          <p:cNvSpPr/>
-          <p:nvPr/>
-        </p:nvSpPr>
-        <p:spPr>
-          <a:xfrm>
-            <a:off x="2496805" y="3025161"/>
-            <a:ext cx="823873" cy="652460"/>
-          </a:xfrm>
-          <a:prstGeom prst="rect">
-            <a:avLst/>
-          </a:prstGeom>
-        </p:spPr>
-        <p:style>
-          <a:lnRef idx="2">
-            <a:schemeClr val="accent1">
-              <a:shade val="50000"/>
-            </a:schemeClr>
-          </a:lnRef>
-          <a:fillRef idx="1">
-            <a:schemeClr val="accent1"/>
-          </a:fillRef>
-          <a:effectRef idx="0">
-            <a:schemeClr val="accent1"/>
-          </a:effectRef>
-          <a:fontRef idx="minor">
-            <a:schemeClr val="lt1"/>
-          </a:fontRef>
-        </p:style>
-        <p:txBody>
-          <a:bodyPr rtlCol="0" anchor="ctr"/>
-          <a:lstStyle/>
-          <a:p>
-            <a:pPr algn="ctr"/>
-            <a:r>
-              <a:rPr lang="en-IE" sz="900" dirty="0"/>
-              <a:t>Check data for Weather Opportunity</a:t>
-            </a:r>
-          </a:p>
-        </p:txBody>
-      </p:sp>
-      <p:sp>
-        <p:nvSpPr>
-          <p:cNvPr id="5" name="Diamond 4">
-            <a:extLst>
-              <a:ext uri="{FF2B5EF4-FFF2-40B4-BE49-F238E27FC236}">
-                <a16:creationId xmlns:a16="http://schemas.microsoft.com/office/drawing/2014/main" id="{B7645173-8D8B-4DA8-A2D5-31ED6A6B20B8}"/>
-              </a:ext>
-            </a:extLst>
-          </p:cNvPr>
-          <p:cNvSpPr/>
-          <p:nvPr/>
-        </p:nvSpPr>
-        <p:spPr>
-          <a:xfrm>
-            <a:off x="3617294" y="2724150"/>
-            <a:ext cx="1554545" cy="1249408"/>
-          </a:xfrm>
-          <a:prstGeom prst="diamond">
-            <a:avLst/>
-          </a:prstGeom>
-        </p:spPr>
-        <p:style>
-          <a:lnRef idx="2">
-            <a:schemeClr val="accent1">
-              <a:shade val="50000"/>
-            </a:schemeClr>
-          </a:lnRef>
-          <a:fillRef idx="1">
-            <a:schemeClr val="accent1"/>
-          </a:fillRef>
-          <a:effectRef idx="0">
-            <a:schemeClr val="accent1"/>
-          </a:effectRef>
-          <a:fontRef idx="minor">
-            <a:schemeClr val="lt1"/>
-          </a:fontRef>
-        </p:style>
-        <p:txBody>
-          <a:bodyPr rtlCol="0" anchor="ctr"/>
-          <a:lstStyle/>
-          <a:p>
-            <a:pPr algn="ctr"/>
-            <a:r>
-              <a:rPr lang="en-IE" sz="900" dirty="0"/>
-              <a:t>Does Weather Opportunity Exist?</a:t>
-            </a:r>
-          </a:p>
-        </p:txBody>
-      </p:sp>
-      <p:sp>
-        <p:nvSpPr>
-          <p:cNvPr id="6" name="Title 5">
-            <a:extLst>
-              <a:ext uri="{FF2B5EF4-FFF2-40B4-BE49-F238E27FC236}">
-                <a16:creationId xmlns:a16="http://schemas.microsoft.com/office/drawing/2014/main" id="{752EB890-E705-4602-84CE-2441274DE89B}"/>
-              </a:ext>
-            </a:extLst>
-          </p:cNvPr>
-          <p:cNvSpPr>
-            <a:spLocks noGrp="1"/>
-          </p:cNvSpPr>
-          <p:nvPr>
-            <p:ph type="title" idx="4294967295"/>
-          </p:nvPr>
-        </p:nvSpPr>
-        <p:spPr>
-          <a:xfrm>
-            <a:off x="838200" y="365126"/>
-            <a:ext cx="10515600" cy="958850"/>
-          </a:xfrm>
-        </p:spPr>
-        <p:txBody>
-          <a:bodyPr/>
-          <a:lstStyle/>
-          <a:p>
-            <a:r>
-              <a:rPr lang="en-IE" b="1" dirty="0"/>
-              <a:t>Potential Logic for Drying Weather Window:</a:t>
-            </a:r>
-          </a:p>
-        </p:txBody>
-      </p:sp>
-      <p:sp>
-        <p:nvSpPr>
-          <p:cNvPr id="8" name="Rectangle 7">
-            <a:extLst>
-              <a:ext uri="{FF2B5EF4-FFF2-40B4-BE49-F238E27FC236}">
-                <a16:creationId xmlns:a16="http://schemas.microsoft.com/office/drawing/2014/main" id="{D162AB0A-2E44-4AA6-B5D8-52D8034ACBF5}"/>
-              </a:ext>
-            </a:extLst>
-          </p:cNvPr>
-          <p:cNvSpPr/>
-          <p:nvPr/>
-        </p:nvSpPr>
-        <p:spPr>
-          <a:xfrm>
-            <a:off x="5090980" y="4315046"/>
-            <a:ext cx="1002501" cy="819150"/>
-          </a:xfrm>
-          <a:prstGeom prst="rect">
-            <a:avLst/>
-          </a:prstGeom>
-        </p:spPr>
-        <p:style>
-          <a:lnRef idx="2">
-            <a:schemeClr val="accent1">
-              <a:shade val="50000"/>
-            </a:schemeClr>
-          </a:lnRef>
-          <a:fillRef idx="1">
-            <a:schemeClr val="accent1"/>
-          </a:fillRef>
-          <a:effectRef idx="0">
-            <a:schemeClr val="accent1"/>
-          </a:effectRef>
-          <a:fontRef idx="minor">
-            <a:schemeClr val="lt1"/>
-          </a:fontRef>
-        </p:style>
-        <p:txBody>
-          <a:bodyPr rtlCol="0" anchor="ctr"/>
-          <a:lstStyle/>
-          <a:p>
-            <a:pPr algn="ctr"/>
-            <a:r>
-              <a:rPr lang="en-IE" sz="900" dirty="0"/>
-              <a:t>Send expected window information for display on Blynk App</a:t>
-            </a:r>
-          </a:p>
-        </p:txBody>
-      </p:sp>
-      <p:sp>
-        <p:nvSpPr>
-          <p:cNvPr id="10" name="Rectangle 9">
-            <a:extLst>
-              <a:ext uri="{FF2B5EF4-FFF2-40B4-BE49-F238E27FC236}">
-                <a16:creationId xmlns:a16="http://schemas.microsoft.com/office/drawing/2014/main" id="{D4CE26B3-4400-4075-A807-47B704776FDC}"/>
-              </a:ext>
-            </a:extLst>
-          </p:cNvPr>
-          <p:cNvSpPr/>
-          <p:nvPr/>
-        </p:nvSpPr>
-        <p:spPr>
-          <a:xfrm>
-            <a:off x="7781925" y="4305459"/>
-            <a:ext cx="1432944" cy="819143"/>
-          </a:xfrm>
-          <a:prstGeom prst="rect">
-            <a:avLst/>
-          </a:prstGeom>
-        </p:spPr>
-        <p:style>
-          <a:lnRef idx="2">
-            <a:schemeClr val="accent1">
-              <a:shade val="50000"/>
-            </a:schemeClr>
-          </a:lnRef>
-          <a:fillRef idx="1">
-            <a:schemeClr val="accent1"/>
-          </a:fillRef>
-          <a:effectRef idx="0">
-            <a:schemeClr val="accent1"/>
-          </a:effectRef>
-          <a:fontRef idx="minor">
-            <a:schemeClr val="lt1"/>
-          </a:fontRef>
-        </p:style>
-        <p:txBody>
-          <a:bodyPr rtlCol="0" anchor="ctr"/>
-          <a:lstStyle/>
-          <a:p>
-            <a:pPr algn="ctr"/>
-            <a:r>
-              <a:rPr lang="en-IE" sz="900" dirty="0"/>
-              <a:t>Monitor current conditions , send  rain/other information for notification on Blynk App</a:t>
-            </a:r>
-          </a:p>
-        </p:txBody>
-      </p:sp>
-      <p:sp>
-        <p:nvSpPr>
-          <p:cNvPr id="11" name="Rectangle 10">
-            <a:extLst>
-              <a:ext uri="{FF2B5EF4-FFF2-40B4-BE49-F238E27FC236}">
-                <a16:creationId xmlns:a16="http://schemas.microsoft.com/office/drawing/2014/main" id="{57EC2910-E852-4430-A62F-3B51C06E962A}"/>
-              </a:ext>
-            </a:extLst>
-          </p:cNvPr>
-          <p:cNvSpPr/>
-          <p:nvPr/>
-        </p:nvSpPr>
-        <p:spPr>
-          <a:xfrm>
-            <a:off x="5090980" y="2013172"/>
-            <a:ext cx="1002501" cy="745990"/>
-          </a:xfrm>
-          <a:prstGeom prst="rect">
-            <a:avLst/>
-          </a:prstGeom>
-        </p:spPr>
-        <p:style>
-          <a:lnRef idx="2">
-            <a:schemeClr val="accent1">
-              <a:shade val="50000"/>
-            </a:schemeClr>
-          </a:lnRef>
-          <a:fillRef idx="1">
-            <a:schemeClr val="accent1"/>
-          </a:fillRef>
-          <a:effectRef idx="0">
-            <a:schemeClr val="accent1"/>
-          </a:effectRef>
-          <a:fontRef idx="minor">
-            <a:schemeClr val="lt1"/>
-          </a:fontRef>
-        </p:style>
-        <p:txBody>
-          <a:bodyPr rtlCol="0" anchor="ctr"/>
-          <a:lstStyle/>
-          <a:p>
-            <a:pPr algn="ctr"/>
-            <a:r>
-              <a:rPr lang="en-IE" sz="900" dirty="0"/>
-              <a:t>Send Current Conditions for display on Blynk App</a:t>
-            </a:r>
-          </a:p>
-        </p:txBody>
-      </p:sp>
-      <p:cxnSp>
-        <p:nvCxnSpPr>
-          <p:cNvPr id="19" name="Connector: Elbow 18">
-            <a:extLst>
-              <a:ext uri="{FF2B5EF4-FFF2-40B4-BE49-F238E27FC236}">
-                <a16:creationId xmlns:a16="http://schemas.microsoft.com/office/drawing/2014/main" id="{C4E2887C-6629-4230-9F20-45445E40613C}"/>
-              </a:ext>
-            </a:extLst>
-          </p:cNvPr>
-          <p:cNvCxnSpPr>
-            <a:cxnSpLocks/>
-            <a:stCxn id="3" idx="3"/>
-            <a:endCxn id="4" idx="1"/>
-          </p:cNvCxnSpPr>
-          <p:nvPr/>
-        </p:nvCxnSpPr>
-        <p:spPr>
-          <a:xfrm flipV="1">
-            <a:off x="2081777" y="3351391"/>
-            <a:ext cx="415028" cy="1"/>
-          </a:xfrm>
-          <a:prstGeom prst="bentConnector3">
-            <a:avLst>
-              <a:gd name="adj1" fmla="val 50000"/>
-            </a:avLst>
-          </a:prstGeom>
-          <a:ln>
-            <a:tailEnd type="triangle"/>
-          </a:ln>
-        </p:spPr>
-        <p:style>
-          <a:lnRef idx="1">
-            <a:schemeClr val="accent1"/>
-          </a:lnRef>
-          <a:fillRef idx="0">
-            <a:schemeClr val="accent1"/>
-          </a:fillRef>
-          <a:effectRef idx="0">
-            <a:schemeClr val="accent1"/>
-          </a:effectRef>
-          <a:fontRef idx="minor">
-            <a:schemeClr val="tx1"/>
-          </a:fontRef>
-        </p:style>
-      </p:cxnSp>
-      <p:cxnSp>
-        <p:nvCxnSpPr>
-          <p:cNvPr id="21" name="Connector: Elbow 20">
-            <a:extLst>
-              <a:ext uri="{FF2B5EF4-FFF2-40B4-BE49-F238E27FC236}">
-                <a16:creationId xmlns:a16="http://schemas.microsoft.com/office/drawing/2014/main" id="{91FD783A-4D53-4329-B1D7-F4AFD4B1C1F5}"/>
-              </a:ext>
-            </a:extLst>
-          </p:cNvPr>
-          <p:cNvCxnSpPr>
-            <a:cxnSpLocks/>
-            <a:stCxn id="4" idx="3"/>
-            <a:endCxn id="5" idx="1"/>
-          </p:cNvCxnSpPr>
-          <p:nvPr/>
-        </p:nvCxnSpPr>
-        <p:spPr>
-          <a:xfrm flipV="1">
-            <a:off x="3320678" y="3348854"/>
-            <a:ext cx="296616" cy="2537"/>
-          </a:xfrm>
-          <a:prstGeom prst="bentConnector3">
-            <a:avLst>
-              <a:gd name="adj1" fmla="val 50000"/>
-            </a:avLst>
-          </a:prstGeom>
-          <a:ln>
-            <a:tailEnd type="triangle"/>
-          </a:ln>
-        </p:spPr>
-        <p:style>
-          <a:lnRef idx="1">
-            <a:schemeClr val="accent1"/>
-          </a:lnRef>
-          <a:fillRef idx="0">
-            <a:schemeClr val="accent1"/>
-          </a:fillRef>
-          <a:effectRef idx="0">
-            <a:schemeClr val="accent1"/>
-          </a:effectRef>
-          <a:fontRef idx="minor">
-            <a:schemeClr val="tx1"/>
-          </a:fontRef>
-        </p:style>
-      </p:cxnSp>
-      <p:sp>
-        <p:nvSpPr>
-          <p:cNvPr id="56" name="TextBox 55">
-            <a:extLst>
-              <a:ext uri="{FF2B5EF4-FFF2-40B4-BE49-F238E27FC236}">
-                <a16:creationId xmlns:a16="http://schemas.microsoft.com/office/drawing/2014/main" id="{F242E110-95C4-4195-8927-EF2FE35D740F}"/>
-              </a:ext>
-            </a:extLst>
-          </p:cNvPr>
-          <p:cNvSpPr txBox="1"/>
-          <p:nvPr/>
-        </p:nvSpPr>
-        <p:spPr>
-          <a:xfrm>
-            <a:off x="4353107" y="4288067"/>
-            <a:ext cx="409557" cy="276999"/>
-          </a:xfrm>
-          <a:prstGeom prst="rect">
-            <a:avLst/>
-          </a:prstGeom>
-          <a:noFill/>
-        </p:spPr>
-        <p:txBody>
-          <a:bodyPr wrap="square" rtlCol="0">
-            <a:spAutoFit/>
-          </a:bodyPr>
-          <a:lstStyle/>
-          <a:p>
-            <a:r>
-              <a:rPr lang="en-IE" sz="1200" dirty="0"/>
-              <a:t>Yes</a:t>
-            </a:r>
-            <a:endParaRPr lang="en-IE" dirty="0"/>
-          </a:p>
-        </p:txBody>
-      </p:sp>
-      <p:cxnSp>
-        <p:nvCxnSpPr>
-          <p:cNvPr id="58" name="Connector: Elbow 57">
-            <a:extLst>
-              <a:ext uri="{FF2B5EF4-FFF2-40B4-BE49-F238E27FC236}">
-                <a16:creationId xmlns:a16="http://schemas.microsoft.com/office/drawing/2014/main" id="{54A9C8EE-8DD0-4105-8B2B-43BFF9F95D6F}"/>
-              </a:ext>
-            </a:extLst>
-          </p:cNvPr>
-          <p:cNvCxnSpPr>
-            <a:cxnSpLocks/>
-            <a:stCxn id="5" idx="2"/>
-            <a:endCxn id="8" idx="1"/>
-          </p:cNvCxnSpPr>
-          <p:nvPr/>
-        </p:nvCxnSpPr>
-        <p:spPr>
-          <a:xfrm rot="16200000" flipH="1">
-            <a:off x="4367242" y="4000882"/>
-            <a:ext cx="751063" cy="696413"/>
-          </a:xfrm>
-          <a:prstGeom prst="bentConnector2">
-            <a:avLst/>
-          </a:prstGeom>
-          <a:ln>
-            <a:tailEnd type="triangle"/>
-          </a:ln>
-        </p:spPr>
-        <p:style>
-          <a:lnRef idx="1">
-            <a:schemeClr val="accent1"/>
-          </a:lnRef>
-          <a:fillRef idx="0">
-            <a:schemeClr val="accent1"/>
-          </a:fillRef>
-          <a:effectRef idx="0">
-            <a:schemeClr val="accent1"/>
-          </a:effectRef>
-          <a:fontRef idx="minor">
-            <a:schemeClr val="tx1"/>
-          </a:fontRef>
-        </p:style>
-      </p:cxnSp>
-      <p:cxnSp>
-        <p:nvCxnSpPr>
-          <p:cNvPr id="88" name="Connector: Elbow 87">
-            <a:extLst>
-              <a:ext uri="{FF2B5EF4-FFF2-40B4-BE49-F238E27FC236}">
-                <a16:creationId xmlns:a16="http://schemas.microsoft.com/office/drawing/2014/main" id="{2CBD1FF1-3550-4AB5-A3A3-F32AE0B877B2}"/>
-              </a:ext>
-            </a:extLst>
-          </p:cNvPr>
-          <p:cNvCxnSpPr>
-            <a:cxnSpLocks/>
-            <a:stCxn id="219" idx="2"/>
-            <a:endCxn id="10" idx="0"/>
-          </p:cNvCxnSpPr>
-          <p:nvPr/>
-        </p:nvCxnSpPr>
-        <p:spPr>
-          <a:xfrm rot="16200000" flipH="1">
-            <a:off x="8031425" y="3838487"/>
-            <a:ext cx="931278" cy="2665"/>
-          </a:xfrm>
-          <a:prstGeom prst="bentConnector3">
-            <a:avLst/>
-          </a:prstGeom>
-          <a:ln>
-            <a:tailEnd type="triangle"/>
-          </a:ln>
-        </p:spPr>
-        <p:style>
-          <a:lnRef idx="1">
-            <a:schemeClr val="accent1"/>
-          </a:lnRef>
-          <a:fillRef idx="0">
-            <a:schemeClr val="accent1"/>
-          </a:fillRef>
-          <a:effectRef idx="0">
-            <a:schemeClr val="accent1"/>
-          </a:effectRef>
-          <a:fontRef idx="minor">
-            <a:schemeClr val="tx1"/>
-          </a:fontRef>
-        </p:style>
-      </p:cxnSp>
-      <p:sp>
-        <p:nvSpPr>
-          <p:cNvPr id="90" name="TextBox 89">
-            <a:extLst>
-              <a:ext uri="{FF2B5EF4-FFF2-40B4-BE49-F238E27FC236}">
-                <a16:creationId xmlns:a16="http://schemas.microsoft.com/office/drawing/2014/main" id="{D14F77E4-413F-47DC-AC94-14BA615F9C7F}"/>
-              </a:ext>
-            </a:extLst>
-          </p:cNvPr>
-          <p:cNvSpPr txBox="1"/>
-          <p:nvPr/>
-        </p:nvSpPr>
-        <p:spPr>
-          <a:xfrm>
-            <a:off x="8489382" y="3706836"/>
-            <a:ext cx="409557" cy="276999"/>
-          </a:xfrm>
-          <a:prstGeom prst="rect">
-            <a:avLst/>
-          </a:prstGeom>
-          <a:noFill/>
-        </p:spPr>
-        <p:txBody>
-          <a:bodyPr wrap="square" rtlCol="0">
-            <a:spAutoFit/>
-          </a:bodyPr>
-          <a:lstStyle/>
-          <a:p>
-            <a:r>
-              <a:rPr lang="en-IE" sz="1200" dirty="0"/>
-              <a:t>Yes</a:t>
-            </a:r>
-            <a:endParaRPr lang="en-IE" dirty="0"/>
-          </a:p>
-        </p:txBody>
-      </p:sp>
-      <p:sp>
-        <p:nvSpPr>
-          <p:cNvPr id="100" name="TextBox 99">
-            <a:extLst>
-              <a:ext uri="{FF2B5EF4-FFF2-40B4-BE49-F238E27FC236}">
-                <a16:creationId xmlns:a16="http://schemas.microsoft.com/office/drawing/2014/main" id="{13829D9E-485A-4171-816A-268341926884}"/>
-              </a:ext>
-            </a:extLst>
-          </p:cNvPr>
-          <p:cNvSpPr txBox="1"/>
-          <p:nvPr/>
-        </p:nvSpPr>
-        <p:spPr>
-          <a:xfrm>
-            <a:off x="9169697" y="2628379"/>
-            <a:ext cx="417606" cy="276999"/>
-          </a:xfrm>
-          <a:prstGeom prst="rect">
-            <a:avLst/>
-          </a:prstGeom>
-          <a:noFill/>
-        </p:spPr>
-        <p:txBody>
-          <a:bodyPr wrap="square" rtlCol="0">
-            <a:spAutoFit/>
-          </a:bodyPr>
-          <a:lstStyle/>
-          <a:p>
-            <a:r>
-              <a:rPr lang="en-IE" sz="1200" dirty="0"/>
-              <a:t>No</a:t>
-            </a:r>
-            <a:endParaRPr lang="en-IE" dirty="0"/>
-          </a:p>
-        </p:txBody>
-      </p:sp>
-      <p:sp>
-        <p:nvSpPr>
-          <p:cNvPr id="105" name="Rectangle 104">
-            <a:extLst>
-              <a:ext uri="{FF2B5EF4-FFF2-40B4-BE49-F238E27FC236}">
-                <a16:creationId xmlns:a16="http://schemas.microsoft.com/office/drawing/2014/main" id="{A27F237F-22A9-4523-937F-862C1AD54623}"/>
-              </a:ext>
-            </a:extLst>
-          </p:cNvPr>
-          <p:cNvSpPr/>
-          <p:nvPr/>
-        </p:nvSpPr>
-        <p:spPr>
-          <a:xfrm>
-            <a:off x="1262625" y="2057400"/>
-            <a:ext cx="819152" cy="652459"/>
-          </a:xfrm>
-          <a:prstGeom prst="rect">
-            <a:avLst/>
-          </a:prstGeom>
-        </p:spPr>
-        <p:style>
-          <a:lnRef idx="2">
-            <a:schemeClr val="accent1">
-              <a:shade val="50000"/>
-            </a:schemeClr>
-          </a:lnRef>
-          <a:fillRef idx="1">
-            <a:schemeClr val="accent1"/>
-          </a:fillRef>
-          <a:effectRef idx="0">
-            <a:schemeClr val="accent1"/>
-          </a:effectRef>
-          <a:fontRef idx="minor">
-            <a:schemeClr val="lt1"/>
-          </a:fontRef>
-        </p:style>
-        <p:txBody>
-          <a:bodyPr rtlCol="0" anchor="ctr"/>
-          <a:lstStyle/>
-          <a:p>
-            <a:pPr algn="ctr"/>
-            <a:r>
-              <a:rPr lang="en-IE" sz="900" dirty="0"/>
-              <a:t>Get current conditions from sensors</a:t>
-            </a:r>
-          </a:p>
-        </p:txBody>
-      </p:sp>
-      <p:cxnSp>
-        <p:nvCxnSpPr>
-          <p:cNvPr id="109" name="Connector: Elbow 108">
-            <a:extLst>
-              <a:ext uri="{FF2B5EF4-FFF2-40B4-BE49-F238E27FC236}">
-                <a16:creationId xmlns:a16="http://schemas.microsoft.com/office/drawing/2014/main" id="{A69126D7-A257-43EE-97B4-A4C3B62FB87D}"/>
-              </a:ext>
-            </a:extLst>
-          </p:cNvPr>
-          <p:cNvCxnSpPr>
-            <a:cxnSpLocks/>
-            <a:stCxn id="105" idx="3"/>
-            <a:endCxn id="11" idx="1"/>
-          </p:cNvCxnSpPr>
-          <p:nvPr/>
-        </p:nvCxnSpPr>
-        <p:spPr>
-          <a:xfrm>
-            <a:off x="2081777" y="2383630"/>
-            <a:ext cx="3009203" cy="2537"/>
-          </a:xfrm>
-          <a:prstGeom prst="bentConnector3">
-            <a:avLst>
-              <a:gd name="adj1" fmla="val 50000"/>
-            </a:avLst>
-          </a:prstGeom>
-          <a:ln>
-            <a:tailEnd type="triangle"/>
-          </a:ln>
-        </p:spPr>
-        <p:style>
-          <a:lnRef idx="1">
-            <a:schemeClr val="accent1"/>
-          </a:lnRef>
-          <a:fillRef idx="0">
-            <a:schemeClr val="accent1"/>
-          </a:fillRef>
-          <a:effectRef idx="0">
-            <a:schemeClr val="accent1"/>
-          </a:effectRef>
-          <a:fontRef idx="minor">
-            <a:schemeClr val="tx1"/>
-          </a:fontRef>
-        </p:style>
-      </p:cxnSp>
-      <p:sp>
-        <p:nvSpPr>
-          <p:cNvPr id="202" name="Diamond 201">
-            <a:extLst>
-              <a:ext uri="{FF2B5EF4-FFF2-40B4-BE49-F238E27FC236}">
-                <a16:creationId xmlns:a16="http://schemas.microsoft.com/office/drawing/2014/main" id="{1386C856-2285-4DFF-8DF1-64C800614E3A}"/>
-              </a:ext>
-            </a:extLst>
-          </p:cNvPr>
-          <p:cNvSpPr/>
-          <p:nvPr/>
-        </p:nvSpPr>
-        <p:spPr>
-          <a:xfrm>
-            <a:off x="9611259" y="2322086"/>
-            <a:ext cx="1289712" cy="1106914"/>
-          </a:xfrm>
-          <a:prstGeom prst="diamond">
-            <a:avLst/>
-          </a:prstGeom>
-        </p:spPr>
-        <p:style>
-          <a:lnRef idx="2">
-            <a:schemeClr val="accent1">
-              <a:shade val="50000"/>
-            </a:schemeClr>
-          </a:lnRef>
-          <a:fillRef idx="1">
-            <a:schemeClr val="accent1"/>
-          </a:fillRef>
-          <a:effectRef idx="0">
-            <a:schemeClr val="accent1"/>
-          </a:effectRef>
-          <a:fontRef idx="minor">
-            <a:schemeClr val="lt1"/>
-          </a:fontRef>
-        </p:style>
-        <p:txBody>
-          <a:bodyPr rtlCol="0" anchor="ctr"/>
-          <a:lstStyle/>
-          <a:p>
-            <a:pPr algn="ctr"/>
-            <a:r>
-              <a:rPr lang="en-IE" sz="900" dirty="0"/>
-              <a:t>Continue?</a:t>
-            </a:r>
-          </a:p>
-        </p:txBody>
-      </p:sp>
-      <p:sp>
-        <p:nvSpPr>
-          <p:cNvPr id="219" name="Diamond 218">
-            <a:extLst>
-              <a:ext uri="{FF2B5EF4-FFF2-40B4-BE49-F238E27FC236}">
-                <a16:creationId xmlns:a16="http://schemas.microsoft.com/office/drawing/2014/main" id="{39F5F784-6B41-4DB4-9689-EA7781A629D8}"/>
-              </a:ext>
-            </a:extLst>
-          </p:cNvPr>
-          <p:cNvSpPr/>
-          <p:nvPr/>
-        </p:nvSpPr>
-        <p:spPr>
-          <a:xfrm>
-            <a:off x="7850876" y="2366998"/>
-            <a:ext cx="1289712" cy="1007183"/>
-          </a:xfrm>
-          <a:prstGeom prst="diamond">
-            <a:avLst/>
-          </a:prstGeom>
-        </p:spPr>
-        <p:style>
-          <a:lnRef idx="2">
-            <a:schemeClr val="accent1">
-              <a:shade val="50000"/>
-            </a:schemeClr>
-          </a:lnRef>
-          <a:fillRef idx="1">
-            <a:schemeClr val="accent1"/>
-          </a:fillRef>
-          <a:effectRef idx="0">
-            <a:schemeClr val="accent1"/>
-          </a:effectRef>
-          <a:fontRef idx="minor">
-            <a:schemeClr val="lt1"/>
-          </a:fontRef>
-        </p:style>
-        <p:txBody>
-          <a:bodyPr rtlCol="0" anchor="ctr"/>
-          <a:lstStyle/>
-          <a:p>
-            <a:pPr algn="ctr"/>
-            <a:r>
-              <a:rPr lang="en-IE" sz="900" dirty="0"/>
-              <a:t>Is Drying in Progress?</a:t>
-            </a:r>
-          </a:p>
-        </p:txBody>
-      </p:sp>
-      <p:cxnSp>
-        <p:nvCxnSpPr>
-          <p:cNvPr id="223" name="Connector: Elbow 222">
-            <a:extLst>
-              <a:ext uri="{FF2B5EF4-FFF2-40B4-BE49-F238E27FC236}">
-                <a16:creationId xmlns:a16="http://schemas.microsoft.com/office/drawing/2014/main" id="{653B5D32-497B-4FCB-9C97-419715345FBE}"/>
-              </a:ext>
-            </a:extLst>
-          </p:cNvPr>
-          <p:cNvCxnSpPr>
-            <a:cxnSpLocks/>
-            <a:stCxn id="219" idx="3"/>
-            <a:endCxn id="202" idx="1"/>
-          </p:cNvCxnSpPr>
-          <p:nvPr/>
-        </p:nvCxnSpPr>
-        <p:spPr>
-          <a:xfrm>
-            <a:off x="9140588" y="2870590"/>
-            <a:ext cx="470671" cy="4953"/>
-          </a:xfrm>
-          <a:prstGeom prst="bentConnector3">
-            <a:avLst/>
-          </a:prstGeom>
-          <a:ln>
-            <a:tailEnd type="triangle"/>
-          </a:ln>
-        </p:spPr>
-        <p:style>
-          <a:lnRef idx="1">
-            <a:schemeClr val="accent1"/>
-          </a:lnRef>
-          <a:fillRef idx="0">
-            <a:schemeClr val="accent1"/>
-          </a:fillRef>
-          <a:effectRef idx="0">
-            <a:schemeClr val="accent1"/>
-          </a:effectRef>
-          <a:fontRef idx="minor">
-            <a:schemeClr val="tx1"/>
-          </a:fontRef>
-        </p:style>
-      </p:cxnSp>
-      <p:cxnSp>
-        <p:nvCxnSpPr>
-          <p:cNvPr id="228" name="Connector: Elbow 227">
-            <a:extLst>
-              <a:ext uri="{FF2B5EF4-FFF2-40B4-BE49-F238E27FC236}">
-                <a16:creationId xmlns:a16="http://schemas.microsoft.com/office/drawing/2014/main" id="{C05807A9-3702-4066-B3F8-828C0E5A33E0}"/>
-              </a:ext>
-            </a:extLst>
-          </p:cNvPr>
-          <p:cNvCxnSpPr>
-            <a:cxnSpLocks/>
-            <a:stCxn id="10" idx="3"/>
-            <a:endCxn id="202" idx="2"/>
-          </p:cNvCxnSpPr>
-          <p:nvPr/>
-        </p:nvCxnSpPr>
-        <p:spPr>
-          <a:xfrm flipV="1">
-            <a:off x="9214869" y="3429000"/>
-            <a:ext cx="1041246" cy="1286031"/>
-          </a:xfrm>
-          <a:prstGeom prst="bentConnector2">
-            <a:avLst/>
-          </a:prstGeom>
-          <a:ln>
-            <a:tailEnd type="triangle"/>
-          </a:ln>
-        </p:spPr>
-        <p:style>
-          <a:lnRef idx="1">
-            <a:schemeClr val="accent1"/>
-          </a:lnRef>
-          <a:fillRef idx="0">
-            <a:schemeClr val="accent1"/>
-          </a:fillRef>
-          <a:effectRef idx="0">
-            <a:schemeClr val="accent1"/>
-          </a:effectRef>
-          <a:fontRef idx="minor">
-            <a:schemeClr val="tx1"/>
-          </a:fontRef>
-        </p:style>
-      </p:cxnSp>
-      <p:sp>
-        <p:nvSpPr>
-          <p:cNvPr id="229" name="Rectangle: Rounded Corners 228">
-            <a:extLst>
-              <a:ext uri="{FF2B5EF4-FFF2-40B4-BE49-F238E27FC236}">
-                <a16:creationId xmlns:a16="http://schemas.microsoft.com/office/drawing/2014/main" id="{59464C2A-67F5-41AE-93E2-E35F5A8B24FA}"/>
-              </a:ext>
-            </a:extLst>
-          </p:cNvPr>
-          <p:cNvSpPr/>
-          <p:nvPr/>
-        </p:nvSpPr>
-        <p:spPr>
-          <a:xfrm>
-            <a:off x="136629" y="2709859"/>
-            <a:ext cx="701571" cy="321464"/>
-          </a:xfrm>
-          <a:prstGeom prst="roundRect">
-            <a:avLst/>
-          </a:prstGeom>
-        </p:spPr>
-        <p:style>
-          <a:lnRef idx="2">
-            <a:schemeClr val="accent1">
-              <a:shade val="50000"/>
-            </a:schemeClr>
-          </a:lnRef>
-          <a:fillRef idx="1">
-            <a:schemeClr val="accent1"/>
-          </a:fillRef>
-          <a:effectRef idx="0">
-            <a:schemeClr val="accent1"/>
-          </a:effectRef>
-          <a:fontRef idx="minor">
-            <a:schemeClr val="lt1"/>
-          </a:fontRef>
-        </p:style>
-        <p:txBody>
-          <a:bodyPr rtlCol="0" anchor="ctr"/>
-          <a:lstStyle/>
-          <a:p>
-            <a:pPr algn="ctr"/>
-            <a:r>
-              <a:rPr lang="en-IE" sz="1200" dirty="0"/>
-              <a:t>Start</a:t>
-            </a:r>
-          </a:p>
-        </p:txBody>
-      </p:sp>
-      <p:sp>
-        <p:nvSpPr>
-          <p:cNvPr id="230" name="Rectangle: Rounded Corners 229">
-            <a:extLst>
-              <a:ext uri="{FF2B5EF4-FFF2-40B4-BE49-F238E27FC236}">
-                <a16:creationId xmlns:a16="http://schemas.microsoft.com/office/drawing/2014/main" id="{FEFD3E77-AA09-4952-AA62-BD1A03B91D38}"/>
-              </a:ext>
-            </a:extLst>
-          </p:cNvPr>
-          <p:cNvSpPr/>
-          <p:nvPr/>
-        </p:nvSpPr>
-        <p:spPr>
-          <a:xfrm>
-            <a:off x="11317564" y="2700334"/>
-            <a:ext cx="842064" cy="343802"/>
-          </a:xfrm>
-          <a:prstGeom prst="roundRect">
-            <a:avLst/>
-          </a:prstGeom>
-        </p:spPr>
-        <p:style>
-          <a:lnRef idx="2">
-            <a:schemeClr val="accent1">
-              <a:shade val="50000"/>
-            </a:schemeClr>
-          </a:lnRef>
-          <a:fillRef idx="1">
-            <a:schemeClr val="accent1"/>
-          </a:fillRef>
-          <a:effectRef idx="0">
-            <a:schemeClr val="accent1"/>
-          </a:effectRef>
-          <a:fontRef idx="minor">
-            <a:schemeClr val="lt1"/>
-          </a:fontRef>
-        </p:style>
-        <p:txBody>
-          <a:bodyPr rtlCol="0" anchor="ctr"/>
-          <a:lstStyle/>
-          <a:p>
-            <a:pPr algn="ctr"/>
-            <a:r>
-              <a:rPr lang="en-IE" sz="1200" dirty="0"/>
-              <a:t>End</a:t>
-            </a:r>
-            <a:endParaRPr lang="en-IE" dirty="0"/>
-          </a:p>
-        </p:txBody>
-      </p:sp>
-      <p:sp>
-        <p:nvSpPr>
-          <p:cNvPr id="276" name="Rectangle 275">
-            <a:extLst>
-              <a:ext uri="{FF2B5EF4-FFF2-40B4-BE49-F238E27FC236}">
-                <a16:creationId xmlns:a16="http://schemas.microsoft.com/office/drawing/2014/main" id="{8DC8038C-CE5B-4667-8E96-93D0E7267E6E}"/>
-              </a:ext>
-            </a:extLst>
-          </p:cNvPr>
-          <p:cNvSpPr/>
-          <p:nvPr/>
-        </p:nvSpPr>
-        <p:spPr>
-          <a:xfrm>
-            <a:off x="6481421" y="2169251"/>
-            <a:ext cx="1002501" cy="1402679"/>
-          </a:xfrm>
-          <a:prstGeom prst="rect">
-            <a:avLst/>
-          </a:prstGeom>
-        </p:spPr>
-        <p:style>
-          <a:lnRef idx="2">
-            <a:schemeClr val="accent1">
-              <a:shade val="50000"/>
-            </a:schemeClr>
-          </a:lnRef>
-          <a:fillRef idx="1">
-            <a:schemeClr val="accent1"/>
-          </a:fillRef>
-          <a:effectRef idx="0">
-            <a:schemeClr val="accent1"/>
-          </a:effectRef>
-          <a:fontRef idx="minor">
-            <a:schemeClr val="lt1"/>
-          </a:fontRef>
-        </p:style>
-        <p:txBody>
-          <a:bodyPr rtlCol="0" anchor="ctr"/>
-          <a:lstStyle/>
-          <a:p>
-            <a:pPr algn="ctr"/>
-            <a:r>
-              <a:rPr lang="en-IE" sz="900" dirty="0"/>
-              <a:t>Display information on Blynk App</a:t>
-            </a:r>
-          </a:p>
-        </p:txBody>
-      </p:sp>
-      <p:cxnSp>
-        <p:nvCxnSpPr>
-          <p:cNvPr id="293" name="Connector: Elbow 292">
-            <a:extLst>
-              <a:ext uri="{FF2B5EF4-FFF2-40B4-BE49-F238E27FC236}">
-                <a16:creationId xmlns:a16="http://schemas.microsoft.com/office/drawing/2014/main" id="{9C4CF743-A330-47A9-BE8C-DFBEE4F96D36}"/>
-              </a:ext>
-            </a:extLst>
-          </p:cNvPr>
-          <p:cNvCxnSpPr>
-            <a:stCxn id="5" idx="3"/>
-            <a:endCxn id="276" idx="1"/>
-          </p:cNvCxnSpPr>
-          <p:nvPr/>
-        </p:nvCxnSpPr>
-        <p:spPr>
-          <a:xfrm flipV="1">
-            <a:off x="5171839" y="2870591"/>
-            <a:ext cx="1309582" cy="478263"/>
-          </a:xfrm>
-          <a:prstGeom prst="bentConnector3">
-            <a:avLst>
-              <a:gd name="adj1" fmla="val 71093"/>
-            </a:avLst>
-          </a:prstGeom>
-          <a:ln>
-            <a:tailEnd type="triangle"/>
-          </a:ln>
-        </p:spPr>
-        <p:style>
-          <a:lnRef idx="1">
-            <a:schemeClr val="accent1"/>
-          </a:lnRef>
-          <a:fillRef idx="0">
-            <a:schemeClr val="accent1"/>
-          </a:fillRef>
-          <a:effectRef idx="0">
-            <a:schemeClr val="accent1"/>
-          </a:effectRef>
-          <a:fontRef idx="minor">
-            <a:schemeClr val="tx1"/>
-          </a:fontRef>
-        </p:style>
-      </p:cxnSp>
-      <p:cxnSp>
-        <p:nvCxnSpPr>
-          <p:cNvPr id="295" name="Connector: Elbow 294">
-            <a:extLst>
-              <a:ext uri="{FF2B5EF4-FFF2-40B4-BE49-F238E27FC236}">
-                <a16:creationId xmlns:a16="http://schemas.microsoft.com/office/drawing/2014/main" id="{FB11CD66-5512-4A54-9D73-CFDC084363F9}"/>
-              </a:ext>
-            </a:extLst>
-          </p:cNvPr>
-          <p:cNvCxnSpPr>
-            <a:stCxn id="11" idx="3"/>
-            <a:endCxn id="276" idx="1"/>
-          </p:cNvCxnSpPr>
-          <p:nvPr/>
-        </p:nvCxnSpPr>
-        <p:spPr>
-          <a:xfrm>
-            <a:off x="6093481" y="2386167"/>
-            <a:ext cx="387940" cy="484424"/>
-          </a:xfrm>
-          <a:prstGeom prst="bentConnector3">
-            <a:avLst/>
-          </a:prstGeom>
-          <a:ln>
-            <a:tailEnd type="triangle"/>
-          </a:ln>
-        </p:spPr>
-        <p:style>
-          <a:lnRef idx="1">
-            <a:schemeClr val="accent1"/>
-          </a:lnRef>
-          <a:fillRef idx="0">
-            <a:schemeClr val="accent1"/>
-          </a:fillRef>
-          <a:effectRef idx="0">
-            <a:schemeClr val="accent1"/>
-          </a:effectRef>
-          <a:fontRef idx="minor">
-            <a:schemeClr val="tx1"/>
-          </a:fontRef>
-        </p:style>
-      </p:cxnSp>
-      <p:cxnSp>
-        <p:nvCxnSpPr>
-          <p:cNvPr id="297" name="Connector: Elbow 296">
-            <a:extLst>
-              <a:ext uri="{FF2B5EF4-FFF2-40B4-BE49-F238E27FC236}">
-                <a16:creationId xmlns:a16="http://schemas.microsoft.com/office/drawing/2014/main" id="{0014E38D-AF09-4A38-B8E4-B2F3E88ABE83}"/>
-              </a:ext>
-            </a:extLst>
-          </p:cNvPr>
-          <p:cNvCxnSpPr>
-            <a:stCxn id="8" idx="3"/>
-            <a:endCxn id="276" idx="1"/>
-          </p:cNvCxnSpPr>
-          <p:nvPr/>
-        </p:nvCxnSpPr>
-        <p:spPr>
-          <a:xfrm flipV="1">
-            <a:off x="6093481" y="2870591"/>
-            <a:ext cx="387940" cy="1854030"/>
-          </a:xfrm>
-          <a:prstGeom prst="bentConnector3">
-            <a:avLst/>
-          </a:prstGeom>
-          <a:ln>
-            <a:tailEnd type="triangle"/>
-          </a:ln>
-        </p:spPr>
-        <p:style>
-          <a:lnRef idx="1">
-            <a:schemeClr val="accent1"/>
-          </a:lnRef>
-          <a:fillRef idx="0">
-            <a:schemeClr val="accent1"/>
-          </a:fillRef>
-          <a:effectRef idx="0">
-            <a:schemeClr val="accent1"/>
-          </a:effectRef>
-          <a:fontRef idx="minor">
-            <a:schemeClr val="tx1"/>
-          </a:fontRef>
-        </p:style>
-      </p:cxnSp>
-      <p:sp>
-        <p:nvSpPr>
-          <p:cNvPr id="300" name="TextBox 299">
-            <a:extLst>
-              <a:ext uri="{FF2B5EF4-FFF2-40B4-BE49-F238E27FC236}">
-                <a16:creationId xmlns:a16="http://schemas.microsoft.com/office/drawing/2014/main" id="{3D6DD8A1-2319-4FA4-8096-9EC331C9C697}"/>
-              </a:ext>
-            </a:extLst>
-          </p:cNvPr>
-          <p:cNvSpPr txBox="1"/>
-          <p:nvPr/>
-        </p:nvSpPr>
-        <p:spPr>
-          <a:xfrm>
-            <a:off x="5423857" y="3121245"/>
-            <a:ext cx="417606" cy="276999"/>
-          </a:xfrm>
-          <a:prstGeom prst="rect">
-            <a:avLst/>
-          </a:prstGeom>
-          <a:noFill/>
-        </p:spPr>
-        <p:txBody>
-          <a:bodyPr wrap="square" rtlCol="0">
-            <a:spAutoFit/>
-          </a:bodyPr>
-          <a:lstStyle/>
-          <a:p>
-            <a:r>
-              <a:rPr lang="en-IE" sz="1200" dirty="0"/>
-              <a:t>No</a:t>
-            </a:r>
-            <a:endParaRPr lang="en-IE" dirty="0"/>
-          </a:p>
-        </p:txBody>
-      </p:sp>
-      <p:cxnSp>
-        <p:nvCxnSpPr>
-          <p:cNvPr id="308" name="Connector: Elbow 307">
-            <a:extLst>
-              <a:ext uri="{FF2B5EF4-FFF2-40B4-BE49-F238E27FC236}">
-                <a16:creationId xmlns:a16="http://schemas.microsoft.com/office/drawing/2014/main" id="{0E31AD66-45D7-47EC-9C09-9D05CFAB2AB2}"/>
-              </a:ext>
-            </a:extLst>
-          </p:cNvPr>
-          <p:cNvCxnSpPr>
-            <a:stCxn id="276" idx="3"/>
-            <a:endCxn id="219" idx="1"/>
-          </p:cNvCxnSpPr>
-          <p:nvPr/>
-        </p:nvCxnSpPr>
-        <p:spPr>
-          <a:xfrm flipV="1">
-            <a:off x="7483922" y="2870590"/>
-            <a:ext cx="366954" cy="1"/>
-          </a:xfrm>
-          <a:prstGeom prst="bentConnector3">
-            <a:avLst/>
-          </a:prstGeom>
-          <a:ln>
-            <a:tailEnd type="triangle"/>
-          </a:ln>
-        </p:spPr>
-        <p:style>
-          <a:lnRef idx="1">
-            <a:schemeClr val="accent1"/>
-          </a:lnRef>
-          <a:fillRef idx="0">
-            <a:schemeClr val="accent1"/>
-          </a:fillRef>
-          <a:effectRef idx="0">
-            <a:schemeClr val="accent1"/>
-          </a:effectRef>
-          <a:fontRef idx="minor">
-            <a:schemeClr val="tx1"/>
-          </a:fontRef>
-        </p:style>
-      </p:cxnSp>
-      <p:cxnSp>
-        <p:nvCxnSpPr>
-          <p:cNvPr id="330" name="Connector: Elbow 329">
-            <a:extLst>
-              <a:ext uri="{FF2B5EF4-FFF2-40B4-BE49-F238E27FC236}">
-                <a16:creationId xmlns:a16="http://schemas.microsoft.com/office/drawing/2014/main" id="{5EAEBA4F-157E-43FC-AECD-BA0BBEA28177}"/>
-              </a:ext>
-            </a:extLst>
-          </p:cNvPr>
-          <p:cNvCxnSpPr>
-            <a:cxnSpLocks/>
-            <a:stCxn id="202" idx="3"/>
-            <a:endCxn id="230" idx="1"/>
-          </p:cNvCxnSpPr>
-          <p:nvPr/>
-        </p:nvCxnSpPr>
-        <p:spPr>
-          <a:xfrm flipV="1">
-            <a:off x="10900971" y="2872235"/>
-            <a:ext cx="416593" cy="3308"/>
-          </a:xfrm>
-          <a:prstGeom prst="bentConnector3">
-            <a:avLst/>
-          </a:prstGeom>
-          <a:ln>
-            <a:tailEnd type="triangle"/>
-          </a:ln>
-        </p:spPr>
-        <p:style>
-          <a:lnRef idx="1">
-            <a:schemeClr val="accent1"/>
-          </a:lnRef>
-          <a:fillRef idx="0">
-            <a:schemeClr val="accent1"/>
-          </a:fillRef>
-          <a:effectRef idx="0">
-            <a:schemeClr val="accent1"/>
-          </a:effectRef>
-          <a:fontRef idx="minor">
-            <a:schemeClr val="tx1"/>
-          </a:fontRef>
-        </p:style>
-      </p:cxnSp>
-      <p:sp>
-        <p:nvSpPr>
-          <p:cNvPr id="333" name="TextBox 332">
-            <a:extLst>
-              <a:ext uri="{FF2B5EF4-FFF2-40B4-BE49-F238E27FC236}">
-                <a16:creationId xmlns:a16="http://schemas.microsoft.com/office/drawing/2014/main" id="{547810F2-7492-4974-9C37-FAAFCC9C8ECD}"/>
-              </a:ext>
-            </a:extLst>
-          </p:cNvPr>
-          <p:cNvSpPr txBox="1"/>
-          <p:nvPr/>
-        </p:nvSpPr>
-        <p:spPr>
-          <a:xfrm>
-            <a:off x="10879755" y="2676098"/>
-            <a:ext cx="417606" cy="276999"/>
-          </a:xfrm>
-          <a:prstGeom prst="rect">
-            <a:avLst/>
-          </a:prstGeom>
-          <a:noFill/>
-        </p:spPr>
-        <p:txBody>
-          <a:bodyPr wrap="square" rtlCol="0">
-            <a:spAutoFit/>
-          </a:bodyPr>
-          <a:lstStyle/>
-          <a:p>
-            <a:r>
-              <a:rPr lang="en-IE" sz="1200" dirty="0"/>
-              <a:t>No</a:t>
-            </a:r>
-            <a:endParaRPr lang="en-IE" dirty="0"/>
-          </a:p>
-        </p:txBody>
-      </p:sp>
-      <p:cxnSp>
-        <p:nvCxnSpPr>
-          <p:cNvPr id="337" name="Connector: Elbow 336">
-            <a:extLst>
-              <a:ext uri="{FF2B5EF4-FFF2-40B4-BE49-F238E27FC236}">
-                <a16:creationId xmlns:a16="http://schemas.microsoft.com/office/drawing/2014/main" id="{E322D4C4-C486-4F42-98FD-327360067866}"/>
-              </a:ext>
-            </a:extLst>
-          </p:cNvPr>
-          <p:cNvCxnSpPr>
-            <a:stCxn id="229" idx="3"/>
-            <a:endCxn id="105" idx="1"/>
-          </p:cNvCxnSpPr>
-          <p:nvPr/>
-        </p:nvCxnSpPr>
-        <p:spPr>
-          <a:xfrm flipV="1">
-            <a:off x="838200" y="2383630"/>
-            <a:ext cx="424425" cy="486961"/>
-          </a:xfrm>
-          <a:prstGeom prst="bentConnector3">
-            <a:avLst/>
-          </a:prstGeom>
-          <a:ln>
-            <a:tailEnd type="triangle"/>
-          </a:ln>
-        </p:spPr>
-        <p:style>
-          <a:lnRef idx="1">
-            <a:schemeClr val="accent1"/>
-          </a:lnRef>
-          <a:fillRef idx="0">
-            <a:schemeClr val="accent1"/>
-          </a:fillRef>
-          <a:effectRef idx="0">
-            <a:schemeClr val="accent1"/>
-          </a:effectRef>
-          <a:fontRef idx="minor">
-            <a:schemeClr val="tx1"/>
-          </a:fontRef>
-        </p:style>
-      </p:cxnSp>
-      <p:cxnSp>
-        <p:nvCxnSpPr>
-          <p:cNvPr id="339" name="Connector: Elbow 338">
-            <a:extLst>
-              <a:ext uri="{FF2B5EF4-FFF2-40B4-BE49-F238E27FC236}">
-                <a16:creationId xmlns:a16="http://schemas.microsoft.com/office/drawing/2014/main" id="{B6C252CC-ACBB-422C-8798-2C8B45E67116}"/>
-              </a:ext>
-            </a:extLst>
-          </p:cNvPr>
-          <p:cNvCxnSpPr>
-            <a:stCxn id="229" idx="3"/>
-            <a:endCxn id="3" idx="1"/>
-          </p:cNvCxnSpPr>
-          <p:nvPr/>
-        </p:nvCxnSpPr>
-        <p:spPr>
-          <a:xfrm>
-            <a:off x="838200" y="2870591"/>
-            <a:ext cx="424425" cy="480801"/>
-          </a:xfrm>
-          <a:prstGeom prst="bentConnector3">
-            <a:avLst/>
-          </a:prstGeom>
-          <a:ln>
-            <a:tailEnd type="triangle"/>
-          </a:ln>
-        </p:spPr>
-        <p:style>
-          <a:lnRef idx="1">
-            <a:schemeClr val="accent1"/>
-          </a:lnRef>
-          <a:fillRef idx="0">
-            <a:schemeClr val="accent1"/>
-          </a:fillRef>
-          <a:effectRef idx="0">
-            <a:schemeClr val="accent1"/>
-          </a:effectRef>
-          <a:fontRef idx="minor">
-            <a:schemeClr val="tx1"/>
-          </a:fontRef>
-        </p:style>
-      </p:cxnSp>
-      <p:cxnSp>
-        <p:nvCxnSpPr>
-          <p:cNvPr id="341" name="Connector: Elbow 340">
-            <a:extLst>
-              <a:ext uri="{FF2B5EF4-FFF2-40B4-BE49-F238E27FC236}">
-                <a16:creationId xmlns:a16="http://schemas.microsoft.com/office/drawing/2014/main" id="{D61BB6E1-53B5-41FA-A25A-F8A39D864B03}"/>
-              </a:ext>
-            </a:extLst>
-          </p:cNvPr>
-          <p:cNvCxnSpPr>
-            <a:stCxn id="202" idx="0"/>
-          </p:cNvCxnSpPr>
-          <p:nvPr/>
-        </p:nvCxnSpPr>
-        <p:spPr>
-          <a:xfrm rot="16200000" flipH="1" flipV="1">
-            <a:off x="5311006" y="-2074521"/>
-            <a:ext cx="548503" cy="9341715"/>
-          </a:xfrm>
-          <a:prstGeom prst="bentConnector4">
-            <a:avLst>
-              <a:gd name="adj1" fmla="val -166707"/>
-              <a:gd name="adj2" fmla="val 99946"/>
-            </a:avLst>
-          </a:prstGeom>
-          <a:ln>
-            <a:tailEnd type="triangle"/>
-          </a:ln>
-        </p:spPr>
-        <p:style>
-          <a:lnRef idx="1">
-            <a:schemeClr val="accent1"/>
-          </a:lnRef>
-          <a:fillRef idx="0">
-            <a:schemeClr val="accent1"/>
-          </a:fillRef>
-          <a:effectRef idx="0">
-            <a:schemeClr val="accent1"/>
-          </a:effectRef>
-          <a:fontRef idx="minor">
-            <a:schemeClr val="tx1"/>
-          </a:fontRef>
-        </p:style>
-      </p:cxnSp>
-      <p:sp>
-        <p:nvSpPr>
-          <p:cNvPr id="344" name="TextBox 343">
-            <a:extLst>
-              <a:ext uri="{FF2B5EF4-FFF2-40B4-BE49-F238E27FC236}">
-                <a16:creationId xmlns:a16="http://schemas.microsoft.com/office/drawing/2014/main" id="{D33263EE-1FBD-497A-9CEA-F142582B0D3E}"/>
-              </a:ext>
-            </a:extLst>
-          </p:cNvPr>
-          <p:cNvSpPr txBox="1"/>
-          <p:nvPr/>
-        </p:nvSpPr>
-        <p:spPr>
-          <a:xfrm>
-            <a:off x="9921836" y="1774014"/>
-            <a:ext cx="409557" cy="276999"/>
-          </a:xfrm>
-          <a:prstGeom prst="rect">
-            <a:avLst/>
-          </a:prstGeom>
-          <a:noFill/>
-        </p:spPr>
-        <p:txBody>
-          <a:bodyPr wrap="square" rtlCol="0">
-            <a:spAutoFit/>
-          </a:bodyPr>
-          <a:lstStyle/>
-          <a:p>
-            <a:r>
-              <a:rPr lang="en-IE" sz="1200" dirty="0"/>
-              <a:t>Yes</a:t>
-            </a:r>
-            <a:endParaRPr lang="en-IE" dirty="0"/>
-          </a:p>
-        </p:txBody>
-      </p:sp>
-    </p:spTree>
-    <p:extLst>
-      <p:ext uri="{BB962C8B-B14F-4D97-AF65-F5344CB8AC3E}">
-        <p14:creationId xmlns:p14="http://schemas.microsoft.com/office/powerpoint/2010/main" val="956159375"/>
-      </p:ext>
-    </p:extLst>
-  </p:cSld>
-  <p:clrMapOvr>
-    <a:masterClrMapping/>
-  </p:clrMapOvr>
-</p:sld>
-</file>
-
-<file path=ppt/slides/slide3.xml><?xml version="1.0" encoding="utf-8"?>
-<p:sld xmlns:a="http://schemas.openxmlformats.org/drawingml/2006/main" xmlns:r="http://schemas.openxmlformats.org/officeDocument/2006/relationships" xmlns:p="http://schemas.openxmlformats.org/presentationml/2006/main">
-  <p:cSld>
-    <p:spTree>
-      <p:nvGrpSpPr>
-        <p:cNvPr id="1" name=""/>
-        <p:cNvGrpSpPr/>
-        <p:nvPr/>
-      </p:nvGrpSpPr>
-      <p:grpSpPr>
-        <a:xfrm>
-          <a:off x="0" y="0"/>
-          <a:ext cx="0" cy="0"/>
-          <a:chOff x="0" y="0"/>
-          <a:chExt cx="0" cy="0"/>
-        </a:xfrm>
-      </p:grpSpPr>
-      <p:sp>
-        <p:nvSpPr>
           <p:cNvPr id="3" name="Rectangle 2">
             <a:extLst>
               <a:ext uri="{FF2B5EF4-FFF2-40B4-BE49-F238E27FC236}">
@@ -5134,8 +3513,8 @@
         </p:nvSpPr>
         <p:spPr>
           <a:xfrm>
-            <a:off x="2306772" y="4120150"/>
-            <a:ext cx="3641022" cy="2677656"/>
+            <a:off x="2306772" y="4127429"/>
+            <a:ext cx="4026916" cy="2677656"/>
           </a:xfrm>
           <a:prstGeom prst="rect">
             <a:avLst/>
@@ -5242,6 +3621,23 @@
             <a:r>
               <a:rPr lang="en-IE" sz="1050" dirty="0"/>
               <a:t>Sense hat simple LED display based on the above</a:t>
+            </a:r>
+          </a:p>
+          <a:p>
+            <a:pPr marL="342900" indent="-342900">
+              <a:buAutoNum type="arabicPeriod"/>
+            </a:pPr>
+            <a:r>
+              <a:rPr lang="en-IE" sz="1050" dirty="0"/>
+              <a:t>Sends actual conditions and drying status to </a:t>
+            </a:r>
+            <a:r>
+              <a:rPr lang="en-IE" sz="1050" dirty="0" err="1"/>
+              <a:t>ThingSpeak</a:t>
+            </a:r>
+            <a:r>
+              <a:rPr lang="en-IE" sz="1050" dirty="0"/>
+              <a:t> channel</a:t>
             </a:r>
           </a:p>
         </p:txBody>
@@ -5444,7 +3840,7 @@
         </p:nvSpPr>
         <p:spPr>
           <a:xfrm>
-            <a:off x="6260630" y="3341105"/>
+            <a:off x="6260630" y="2529341"/>
             <a:ext cx="1470493" cy="369332"/>
           </a:xfrm>
           <a:prstGeom prst="rect">
@@ -5777,7 +4173,7 @@
         </p:blipFill>
         <p:spPr>
           <a:xfrm>
-            <a:off x="6444244" y="2243198"/>
+            <a:off x="6444244" y="1431434"/>
             <a:ext cx="1091647" cy="1084369"/>
           </a:xfrm>
           <a:prstGeom prst="rect">
@@ -5872,13 +4268,16 @@
               </a:ext>
             </a:extLst>
           </p:cNvPr>
-          <p:cNvCxnSpPr/>
+          <p:cNvCxnSpPr>
+            <a:cxnSpLocks/>
+            <a:endCxn id="45" idx="1"/>
+          </p:cNvCxnSpPr>
           <p:nvPr/>
         </p:nvCxnSpPr>
         <p:spPr>
-          <a:xfrm>
-            <a:off x="3976382" y="2642532"/>
-            <a:ext cx="2332139" cy="0"/>
+          <a:xfrm flipV="1">
+            <a:off x="3976382" y="1973619"/>
+            <a:ext cx="2467862" cy="668914"/>
           </a:xfrm>
           <a:prstGeom prst="straightConnector1">
             <a:avLst/>
@@ -5911,13 +4310,15 @@
               </a:ext>
             </a:extLst>
           </p:cNvPr>
-          <p:cNvCxnSpPr/>
+          <p:cNvCxnSpPr>
+            <a:cxnSpLocks/>
+          </p:cNvCxnSpPr>
           <p:nvPr/>
         </p:nvCxnSpPr>
         <p:spPr>
           <a:xfrm flipH="1">
-            <a:off x="3951215" y="2910980"/>
-            <a:ext cx="2382473" cy="0"/>
+            <a:off x="3951216" y="2185692"/>
+            <a:ext cx="2493028" cy="725288"/>
           </a:xfrm>
           <a:prstGeom prst="straightConnector1">
             <a:avLst/>
@@ -5957,9 +4358,9 @@
           <p:nvPr/>
         </p:nvCxnSpPr>
         <p:spPr>
-          <a:xfrm flipV="1">
-            <a:off x="7535891" y="2774414"/>
-            <a:ext cx="2991800" cy="10969"/>
+          <a:xfrm>
+            <a:off x="7535891" y="1973619"/>
+            <a:ext cx="2991800" cy="859318"/>
           </a:xfrm>
           <a:prstGeom prst="straightConnector1">
             <a:avLst/>
@@ -5998,9 +4399,9 @@
           <p:nvPr/>
         </p:nvCxnSpPr>
         <p:spPr>
-          <a:xfrm flipH="1">
-            <a:off x="7535891" y="3043097"/>
-            <a:ext cx="2991800" cy="35961"/>
+          <a:xfrm flipH="1" flipV="1">
+            <a:off x="7535891" y="2170246"/>
+            <a:ext cx="2991800" cy="872851"/>
           </a:xfrm>
           <a:prstGeom prst="straightConnector1">
             <a:avLst/>
@@ -6079,7 +4480,17 @@
             </a:pPr>
             <a:r>
               <a:rPr lang="en-IE" sz="1050" dirty="0"/>
-              <a:t>Using Blynk Webhook writes Drying in Progress status to </a:t>
+              <a:t>Webpage button for full weather forecast</a:t>
+            </a:r>
+          </a:p>
+          <a:p>
+            <a:pPr marL="171450" indent="-171450">
+              <a:buFont typeface="Arial" panose="020B0604020202020204" pitchFamily="34" charset="0"/>
+              <a:buChar char="•"/>
+            </a:pPr>
+            <a:r>
+              <a:rPr lang="en-IE" sz="1050" dirty="0"/>
+              <a:t>Webpage button for </a:t>
             </a:r>
             <a:r>
               <a:rPr lang="en-IE" sz="1050" dirty="0" err="1"/>
@@ -6087,11 +4498,8 @@
             </a:r>
             <a:r>
               <a:rPr lang="en-IE" sz="1050" dirty="0"/>
-              <a:t> Drying Channel.</a:t>
-            </a:r>
-          </a:p>
-          <a:p>
-            <a:endParaRPr lang="en-IE" sz="1050" dirty="0"/>
+              <a:t> channel</a:t>
+            </a:r>
           </a:p>
         </p:txBody>
       </p:sp>
@@ -6126,7 +4534,7 @@
         </p:blipFill>
         <p:spPr>
           <a:xfrm>
-            <a:off x="6738714" y="4912946"/>
+            <a:off x="6910663" y="3688335"/>
             <a:ext cx="2463492" cy="546032"/>
           </a:xfrm>
           <a:prstGeom prst="rect">
@@ -6134,6 +4542,226 @@
           </a:prstGeom>
         </p:spPr>
       </p:pic>
+      <p:sp>
+        <p:nvSpPr>
+          <p:cNvPr id="2" name="TextBox 1">
+            <a:extLst>
+              <a:ext uri="{FF2B5EF4-FFF2-40B4-BE49-F238E27FC236}">
+                <a16:creationId xmlns:a16="http://schemas.microsoft.com/office/drawing/2014/main" id="{357618AE-8E8E-4297-8562-0AE4128C9E68}"/>
+              </a:ext>
+            </a:extLst>
+          </p:cNvPr>
+          <p:cNvSpPr txBox="1"/>
+          <p:nvPr/>
+        </p:nvSpPr>
+        <p:spPr>
+          <a:xfrm>
+            <a:off x="6910663" y="4285490"/>
+            <a:ext cx="2463492" cy="738664"/>
+          </a:xfrm>
+          <a:prstGeom prst="rect">
+            <a:avLst/>
+          </a:prstGeom>
+          <a:noFill/>
+          <a:ln>
+            <a:solidFill>
+              <a:schemeClr val="accent1"/>
+            </a:solidFill>
+          </a:ln>
+        </p:spPr>
+        <p:txBody>
+          <a:bodyPr wrap="square" rtlCol="0">
+            <a:spAutoFit/>
+          </a:bodyPr>
+          <a:lstStyle/>
+          <a:p>
+            <a:r>
+              <a:rPr lang="en-IE" sz="1050" dirty="0"/>
+              <a:t>Displays temperature, humidity, rain status and drying status.</a:t>
+            </a:r>
+          </a:p>
+          <a:p>
+            <a:r>
+              <a:rPr lang="en-IE" sz="1050" dirty="0"/>
+              <a:t>Using </a:t>
+            </a:r>
+            <a:r>
+              <a:rPr lang="en-IE" sz="1050" dirty="0" err="1"/>
+              <a:t>ThingTweet</a:t>
+            </a:r>
+            <a:r>
+              <a:rPr lang="en-IE" sz="1050" dirty="0"/>
+              <a:t> sends tweet if Rain and Drying in Progress.</a:t>
+            </a:r>
+          </a:p>
+        </p:txBody>
+      </p:sp>
+      <p:cxnSp>
+        <p:nvCxnSpPr>
+          <p:cNvPr id="27" name="Straight Arrow Connector 26">
+            <a:extLst>
+              <a:ext uri="{FF2B5EF4-FFF2-40B4-BE49-F238E27FC236}">
+                <a16:creationId xmlns:a16="http://schemas.microsoft.com/office/drawing/2014/main" id="{B0E794CA-232D-4221-879F-598AEFC1B539}"/>
+              </a:ext>
+            </a:extLst>
+          </p:cNvPr>
+          <p:cNvCxnSpPr>
+            <a:cxnSpLocks/>
+            <a:stCxn id="2" idx="2"/>
+          </p:cNvCxnSpPr>
+          <p:nvPr/>
+        </p:nvCxnSpPr>
+        <p:spPr>
+          <a:xfrm>
+            <a:off x="8142409" y="5024154"/>
+            <a:ext cx="1231746" cy="854080"/>
+          </a:xfrm>
+          <a:prstGeom prst="straightConnector1">
+            <a:avLst/>
+          </a:prstGeom>
+          <a:ln w="38100">
+            <a:tailEnd type="triangle"/>
+          </a:ln>
+        </p:spPr>
+        <p:style>
+          <a:lnRef idx="1">
+            <a:schemeClr val="accent1"/>
+          </a:lnRef>
+          <a:fillRef idx="0">
+            <a:schemeClr val="accent1"/>
+          </a:fillRef>
+          <a:effectRef idx="0">
+            <a:schemeClr val="accent1"/>
+          </a:effectRef>
+          <a:fontRef idx="minor">
+            <a:schemeClr val="tx1"/>
+          </a:fontRef>
+        </p:style>
+      </p:cxnSp>
+      <p:cxnSp>
+        <p:nvCxnSpPr>
+          <p:cNvPr id="28" name="Straight Arrow Connector 27">
+            <a:extLst>
+              <a:ext uri="{FF2B5EF4-FFF2-40B4-BE49-F238E27FC236}">
+                <a16:creationId xmlns:a16="http://schemas.microsoft.com/office/drawing/2014/main" id="{401A69AD-F110-44AA-81E9-9E4EB9865F5A}"/>
+              </a:ext>
+            </a:extLst>
+          </p:cNvPr>
+          <p:cNvCxnSpPr>
+            <a:cxnSpLocks/>
+            <a:stCxn id="5" idx="3"/>
+            <a:endCxn id="66" idx="1"/>
+          </p:cNvCxnSpPr>
+          <p:nvPr/>
+        </p:nvCxnSpPr>
+        <p:spPr>
+          <a:xfrm>
+            <a:off x="4196722" y="3257768"/>
+            <a:ext cx="2713941" cy="703583"/>
+          </a:xfrm>
+          <a:prstGeom prst="straightConnector1">
+            <a:avLst/>
+          </a:prstGeom>
+          <a:ln w="38100">
+            <a:tailEnd type="triangle"/>
+          </a:ln>
+        </p:spPr>
+        <p:style>
+          <a:lnRef idx="1">
+            <a:schemeClr val="accent1"/>
+          </a:lnRef>
+          <a:fillRef idx="0">
+            <a:schemeClr val="accent1"/>
+          </a:fillRef>
+          <a:effectRef idx="0">
+            <a:schemeClr val="accent1"/>
+          </a:effectRef>
+          <a:fontRef idx="minor">
+            <a:schemeClr val="tx1"/>
+          </a:fontRef>
+        </p:style>
+      </p:cxnSp>
+      <p:pic>
+        <p:nvPicPr>
+          <p:cNvPr id="17" name="Picture 16" descr="Logo&#10;&#10;Description automatically generated">
+            <a:extLst>
+              <a:ext uri="{FF2B5EF4-FFF2-40B4-BE49-F238E27FC236}">
+                <a16:creationId xmlns:a16="http://schemas.microsoft.com/office/drawing/2014/main" id="{DE87C7F8-BE18-4805-8DA9-D3745F6F9DF8}"/>
+              </a:ext>
+            </a:extLst>
+          </p:cNvPr>
+          <p:cNvPicPr>
+            <a:picLocks noChangeAspect="1"/>
+          </p:cNvPicPr>
+          <p:nvPr/>
+        </p:nvPicPr>
+        <p:blipFill>
+          <a:blip r:embed="rId18">
+            <a:extLst>
+              <a:ext uri="{28A0092B-C50C-407E-A947-70E740481C1C}">
+                <a14:useLocalDpi xmlns:a14="http://schemas.microsoft.com/office/drawing/2010/main" val="0"/>
+              </a:ext>
+              <a:ext uri="{837473B0-CC2E-450A-ABE3-18F120FF3D39}">
+                <a1611:picAttrSrcUrl xmlns:a1611="http://schemas.microsoft.com/office/drawing/2016/11/main" r:id="rId19"/>
+              </a:ext>
+            </a:extLst>
+          </a:blip>
+          <a:stretch>
+            <a:fillRect/>
+          </a:stretch>
+        </p:blipFill>
+        <p:spPr>
+          <a:xfrm>
+            <a:off x="8877916" y="5878234"/>
+            <a:ext cx="1395088" cy="524819"/>
+          </a:xfrm>
+          <a:prstGeom prst="rect">
+            <a:avLst/>
+          </a:prstGeom>
+        </p:spPr>
+      </p:pic>
+      <p:cxnSp>
+        <p:nvCxnSpPr>
+          <p:cNvPr id="40" name="Straight Arrow Connector 39">
+            <a:extLst>
+              <a:ext uri="{FF2B5EF4-FFF2-40B4-BE49-F238E27FC236}">
+                <a16:creationId xmlns:a16="http://schemas.microsoft.com/office/drawing/2014/main" id="{3D40A435-55A5-4274-A1A3-5A76074EBDC6}"/>
+              </a:ext>
+            </a:extLst>
+          </p:cNvPr>
+          <p:cNvCxnSpPr>
+            <a:cxnSpLocks/>
+            <a:endCxn id="66" idx="3"/>
+          </p:cNvCxnSpPr>
+          <p:nvPr/>
+        </p:nvCxnSpPr>
+        <p:spPr>
+          <a:xfrm flipH="1">
+            <a:off x="9374155" y="3257768"/>
+            <a:ext cx="1153536" cy="703583"/>
+          </a:xfrm>
+          <a:prstGeom prst="straightConnector1">
+            <a:avLst/>
+          </a:prstGeom>
+          <a:ln w="38100">
+            <a:tailEnd type="triangle"/>
+          </a:ln>
+        </p:spPr>
+        <p:style>
+          <a:lnRef idx="1">
+            <a:schemeClr val="accent1"/>
+          </a:lnRef>
+          <a:fillRef idx="0">
+            <a:schemeClr val="accent1"/>
+          </a:fillRef>
+          <a:effectRef idx="0">
+            <a:schemeClr val="accent1"/>
+          </a:effectRef>
+          <a:fontRef idx="minor">
+            <a:schemeClr val="tx1"/>
+          </a:fontRef>
+        </p:style>
+      </p:cxnSp>
     </p:spTree>
     <p:extLst>
       <p:ext uri="{BB962C8B-B14F-4D97-AF65-F5344CB8AC3E}">

</xml_diff>